<commit_message>
added resub to git
</commit_message>
<xml_diff>
--- a/assignment work/practical work/table design.pptx
+++ b/assignment work/practical work/table design.pptx
@@ -104,6 +104,11 @@
       </a:defRPr>
     </a:lvl9pPr>
   </p:defaultTextStyle>
+  <p:extLst>
+    <p:ext uri="{EFAFB233-063F-42B5-8137-9DF3F51BA10A}">
+      <p15:sldGuideLst xmlns:p15="http://schemas.microsoft.com/office/powerpoint/2012/main"/>
+    </p:ext>
+  </p:extLst>
 </p:presentation>
 </file>
 
@@ -256,7 +261,7 @@
           <a:p>
             <a:fld id="{08B806BD-622F-4F66-A176-E3FBF7EC4B7E}" type="datetimeFigureOut">
               <a:rPr lang="en-GB" smtClean="0"/>
-              <a:t>17/05/2020</a:t>
+              <a:t>01/08/2020</a:t>
             </a:fld>
             <a:endParaRPr lang="en-GB"/>
           </a:p>
@@ -456,7 +461,7 @@
           <a:p>
             <a:fld id="{08B806BD-622F-4F66-A176-E3FBF7EC4B7E}" type="datetimeFigureOut">
               <a:rPr lang="en-GB" smtClean="0"/>
-              <a:t>17/05/2020</a:t>
+              <a:t>01/08/2020</a:t>
             </a:fld>
             <a:endParaRPr lang="en-GB"/>
           </a:p>
@@ -666,7 +671,7 @@
           <a:p>
             <a:fld id="{08B806BD-622F-4F66-A176-E3FBF7EC4B7E}" type="datetimeFigureOut">
               <a:rPr lang="en-GB" smtClean="0"/>
-              <a:t>17/05/2020</a:t>
+              <a:t>01/08/2020</a:t>
             </a:fld>
             <a:endParaRPr lang="en-GB"/>
           </a:p>
@@ -866,7 +871,7 @@
           <a:p>
             <a:fld id="{08B806BD-622F-4F66-A176-E3FBF7EC4B7E}" type="datetimeFigureOut">
               <a:rPr lang="en-GB" smtClean="0"/>
-              <a:t>17/05/2020</a:t>
+              <a:t>01/08/2020</a:t>
             </a:fld>
             <a:endParaRPr lang="en-GB"/>
           </a:p>
@@ -1142,7 +1147,7 @@
           <a:p>
             <a:fld id="{08B806BD-622F-4F66-A176-E3FBF7EC4B7E}" type="datetimeFigureOut">
               <a:rPr lang="en-GB" smtClean="0"/>
-              <a:t>17/05/2020</a:t>
+              <a:t>01/08/2020</a:t>
             </a:fld>
             <a:endParaRPr lang="en-GB"/>
           </a:p>
@@ -1410,7 +1415,7 @@
           <a:p>
             <a:fld id="{08B806BD-622F-4F66-A176-E3FBF7EC4B7E}" type="datetimeFigureOut">
               <a:rPr lang="en-GB" smtClean="0"/>
-              <a:t>17/05/2020</a:t>
+              <a:t>01/08/2020</a:t>
             </a:fld>
             <a:endParaRPr lang="en-GB"/>
           </a:p>
@@ -1825,7 +1830,7 @@
           <a:p>
             <a:fld id="{08B806BD-622F-4F66-A176-E3FBF7EC4B7E}" type="datetimeFigureOut">
               <a:rPr lang="en-GB" smtClean="0"/>
-              <a:t>17/05/2020</a:t>
+              <a:t>01/08/2020</a:t>
             </a:fld>
             <a:endParaRPr lang="en-GB"/>
           </a:p>
@@ -1967,7 +1972,7 @@
           <a:p>
             <a:fld id="{08B806BD-622F-4F66-A176-E3FBF7EC4B7E}" type="datetimeFigureOut">
               <a:rPr lang="en-GB" smtClean="0"/>
-              <a:t>17/05/2020</a:t>
+              <a:t>01/08/2020</a:t>
             </a:fld>
             <a:endParaRPr lang="en-GB"/>
           </a:p>
@@ -2080,7 +2085,7 @@
           <a:p>
             <a:fld id="{08B806BD-622F-4F66-A176-E3FBF7EC4B7E}" type="datetimeFigureOut">
               <a:rPr lang="en-GB" smtClean="0"/>
-              <a:t>17/05/2020</a:t>
+              <a:t>01/08/2020</a:t>
             </a:fld>
             <a:endParaRPr lang="en-GB"/>
           </a:p>
@@ -2393,7 +2398,7 @@
           <a:p>
             <a:fld id="{08B806BD-622F-4F66-A176-E3FBF7EC4B7E}" type="datetimeFigureOut">
               <a:rPr lang="en-GB" smtClean="0"/>
-              <a:t>17/05/2020</a:t>
+              <a:t>01/08/2020</a:t>
             </a:fld>
             <a:endParaRPr lang="en-GB"/>
           </a:p>
@@ -2682,7 +2687,7 @@
           <a:p>
             <a:fld id="{08B806BD-622F-4F66-A176-E3FBF7EC4B7E}" type="datetimeFigureOut">
               <a:rPr lang="en-GB" smtClean="0"/>
-              <a:t>17/05/2020</a:t>
+              <a:t>01/08/2020</a:t>
             </a:fld>
             <a:endParaRPr lang="en-GB"/>
           </a:p>
@@ -2925,7 +2930,7 @@
           <a:p>
             <a:fld id="{08B806BD-622F-4F66-A176-E3FBF7EC4B7E}" type="datetimeFigureOut">
               <a:rPr lang="en-GB" smtClean="0"/>
-              <a:t>17/05/2020</a:t>
+              <a:t>01/08/2020</a:t>
             </a:fld>
             <a:endParaRPr lang="en-GB"/>
           </a:p>
@@ -3556,8 +3561,8 @@
         </p:nvSpPr>
         <p:spPr>
           <a:xfrm>
-            <a:off x="8953502" y="3962400"/>
-            <a:ext cx="2400298" cy="1803400"/>
+            <a:off x="7829550" y="3924301"/>
+            <a:ext cx="1993897" cy="1803400"/>
           </a:xfrm>
           <a:prstGeom prst="roundRect">
             <a:avLst/>
@@ -3590,19 +3595,15 @@
           <a:lstStyle/>
           <a:p>
             <a:r>
-              <a:rPr lang="en-GB" dirty="0"/>
-              <a:t>    </a:t>
-            </a:r>
-            <a:r>
               <a:rPr lang="en-GB" u="sng" dirty="0" err="1"/>
-              <a:t>product_QnA</a:t>
+              <a:t>Product_Q</a:t>
             </a:r>
             <a:endParaRPr lang="en-GB" u="sng" dirty="0"/>
           </a:p>
           <a:p>
             <a:r>
               <a:rPr lang="en-GB" dirty="0" err="1"/>
-              <a:t>product_id</a:t>
+              <a:t>Product_id</a:t>
             </a:r>
             <a:r>
               <a:rPr lang="en-GB" dirty="0"/>
@@ -3611,25 +3612,20 @@
           </a:p>
           <a:p>
             <a:r>
-              <a:rPr lang="en-GB" dirty="0" err="1"/>
+              <a:rPr lang="en-GB" sz="1600" dirty="0" err="1"/>
               <a:t>question_number</a:t>
             </a:r>
             <a:r>
-              <a:rPr lang="en-GB" dirty="0"/>
-              <a:t>**</a:t>
-            </a:r>
-          </a:p>
-          <a:p>
-            <a:r>
-              <a:rPr lang="en-GB" dirty="0"/>
+              <a:rPr lang="en-GB" sz="1600" dirty="0"/>
+              <a:t>*</a:t>
+            </a:r>
+          </a:p>
+          <a:p>
+            <a:r>
+              <a:rPr lang="en-GB" sz="1600" dirty="0"/>
               <a:t>question</a:t>
             </a:r>
-          </a:p>
-          <a:p>
-            <a:r>
-              <a:rPr lang="en-GB" dirty="0"/>
-              <a:t>answer</a:t>
-            </a:r>
+            <a:endParaRPr lang="en-GB" dirty="0"/>
           </a:p>
         </p:txBody>
       </p:sp>
@@ -4408,13 +4404,15 @@
               </a:ext>
             </a:extLst>
           </p:cNvPr>
-          <p:cNvCxnSpPr/>
+          <p:cNvCxnSpPr>
+            <a:cxnSpLocks/>
+          </p:cNvCxnSpPr>
           <p:nvPr/>
         </p:nvCxnSpPr>
         <p:spPr>
           <a:xfrm flipV="1">
-            <a:off x="10109200" y="2527300"/>
-            <a:ext cx="0" cy="1447800"/>
+            <a:off x="8845549" y="2527300"/>
+            <a:ext cx="374651" cy="1397001"/>
           </a:xfrm>
           <a:prstGeom prst="line">
             <a:avLst/>
@@ -4451,8 +4449,8 @@
         </p:nvCxnSpPr>
         <p:spPr>
           <a:xfrm flipV="1">
-            <a:off x="10109200" y="2527300"/>
-            <a:ext cx="254000" cy="546100"/>
+            <a:off x="9093200" y="2527300"/>
+            <a:ext cx="301623" cy="488951"/>
           </a:xfrm>
           <a:prstGeom prst="line">
             <a:avLst/>
@@ -4489,8 +4487,195 @@
         </p:nvCxnSpPr>
         <p:spPr>
           <a:xfrm flipH="1" flipV="1">
-            <a:off x="9867900" y="2527300"/>
-            <a:ext cx="241300" cy="546100"/>
+            <a:off x="9032874" y="2424331"/>
+            <a:ext cx="53975" cy="585569"/>
+          </a:xfrm>
+          <a:prstGeom prst="line">
+            <a:avLst/>
+          </a:prstGeom>
+        </p:spPr>
+        <p:style>
+          <a:lnRef idx="3">
+            <a:schemeClr val="dk1"/>
+          </a:lnRef>
+          <a:fillRef idx="0">
+            <a:schemeClr val="dk1"/>
+          </a:fillRef>
+          <a:effectRef idx="2">
+            <a:schemeClr val="dk1"/>
+          </a:effectRef>
+          <a:fontRef idx="minor">
+            <a:schemeClr val="tx1"/>
+          </a:fontRef>
+        </p:style>
+      </p:cxnSp>
+      <p:sp>
+        <p:nvSpPr>
+          <p:cNvPr id="30" name="Rectangle: Rounded Corners 29">
+            <a:extLst>
+              <a:ext uri="{FF2B5EF4-FFF2-40B4-BE49-F238E27FC236}">
+                <a16:creationId xmlns:a16="http://schemas.microsoft.com/office/drawing/2014/main" id="{0C39A988-5464-4869-9721-76DE77C3A7FD}"/>
+              </a:ext>
+            </a:extLst>
+          </p:cNvPr>
+          <p:cNvSpPr/>
+          <p:nvPr/>
+        </p:nvSpPr>
+        <p:spPr>
+          <a:xfrm>
+            <a:off x="10115551" y="3924301"/>
+            <a:ext cx="1993897" cy="1803400"/>
+          </a:xfrm>
+          <a:prstGeom prst="roundRect">
+            <a:avLst/>
+          </a:prstGeom>
+          <a:solidFill>
+            <a:schemeClr val="accent1">
+              <a:lumMod val="60000"/>
+              <a:lumOff val="40000"/>
+            </a:schemeClr>
+          </a:solidFill>
+        </p:spPr>
+        <p:style>
+          <a:lnRef idx="2">
+            <a:schemeClr val="accent1">
+              <a:shade val="50000"/>
+            </a:schemeClr>
+          </a:lnRef>
+          <a:fillRef idx="1">
+            <a:schemeClr val="accent1"/>
+          </a:fillRef>
+          <a:effectRef idx="0">
+            <a:schemeClr val="accent1"/>
+          </a:effectRef>
+          <a:fontRef idx="minor">
+            <a:schemeClr val="lt1"/>
+          </a:fontRef>
+        </p:style>
+        <p:txBody>
+          <a:bodyPr rtlCol="0" anchor="ctr"/>
+          <a:lstStyle/>
+          <a:p>
+            <a:r>
+              <a:rPr lang="en-GB" u="sng" dirty="0" err="1"/>
+              <a:t>Product_A</a:t>
+            </a:r>
+            <a:endParaRPr lang="en-GB" u="sng" dirty="0"/>
+          </a:p>
+          <a:p>
+            <a:r>
+              <a:rPr lang="en-GB" sz="1600" dirty="0" err="1"/>
+              <a:t>question_number</a:t>
+            </a:r>
+            <a:r>
+              <a:rPr lang="en-GB" sz="1600" dirty="0"/>
+              <a:t>*</a:t>
+            </a:r>
+          </a:p>
+          <a:p>
+            <a:r>
+              <a:rPr lang="en-GB" sz="1600" dirty="0"/>
+              <a:t>answer</a:t>
+            </a:r>
+          </a:p>
+        </p:txBody>
+      </p:sp>
+      <p:cxnSp>
+        <p:nvCxnSpPr>
+          <p:cNvPr id="32" name="Straight Connector 31">
+            <a:extLst>
+              <a:ext uri="{FF2B5EF4-FFF2-40B4-BE49-F238E27FC236}">
+                <a16:creationId xmlns:a16="http://schemas.microsoft.com/office/drawing/2014/main" id="{E80D448D-9B92-4571-A8CE-22E911E65E92}"/>
+              </a:ext>
+            </a:extLst>
+          </p:cNvPr>
+          <p:cNvCxnSpPr>
+            <a:cxnSpLocks/>
+            <a:stCxn id="7" idx="3"/>
+            <a:endCxn id="30" idx="1"/>
+          </p:cNvCxnSpPr>
+          <p:nvPr/>
+        </p:nvCxnSpPr>
+        <p:spPr>
+          <a:xfrm>
+            <a:off x="9823447" y="4826001"/>
+            <a:ext cx="292104" cy="0"/>
+          </a:xfrm>
+          <a:prstGeom prst="line">
+            <a:avLst/>
+          </a:prstGeom>
+        </p:spPr>
+        <p:style>
+          <a:lnRef idx="3">
+            <a:schemeClr val="dk1"/>
+          </a:lnRef>
+          <a:fillRef idx="0">
+            <a:schemeClr val="dk1"/>
+          </a:fillRef>
+          <a:effectRef idx="2">
+            <a:schemeClr val="dk1"/>
+          </a:effectRef>
+          <a:fontRef idx="minor">
+            <a:schemeClr val="tx1"/>
+          </a:fontRef>
+        </p:style>
+      </p:cxnSp>
+      <p:cxnSp>
+        <p:nvCxnSpPr>
+          <p:cNvPr id="35" name="Straight Connector 34">
+            <a:extLst>
+              <a:ext uri="{FF2B5EF4-FFF2-40B4-BE49-F238E27FC236}">
+                <a16:creationId xmlns:a16="http://schemas.microsoft.com/office/drawing/2014/main" id="{5CCA9B42-9B16-4DE4-9D60-A5187D44F403}"/>
+              </a:ext>
+            </a:extLst>
+          </p:cNvPr>
+          <p:cNvCxnSpPr>
+            <a:cxnSpLocks/>
+          </p:cNvCxnSpPr>
+          <p:nvPr/>
+        </p:nvCxnSpPr>
+        <p:spPr>
+          <a:xfrm flipV="1">
+            <a:off x="9828206" y="4826002"/>
+            <a:ext cx="141293" cy="177801"/>
+          </a:xfrm>
+          <a:prstGeom prst="line">
+            <a:avLst/>
+          </a:prstGeom>
+        </p:spPr>
+        <p:style>
+          <a:lnRef idx="3">
+            <a:schemeClr val="dk1"/>
+          </a:lnRef>
+          <a:fillRef idx="0">
+            <a:schemeClr val="dk1"/>
+          </a:fillRef>
+          <a:effectRef idx="2">
+            <a:schemeClr val="dk1"/>
+          </a:effectRef>
+          <a:fontRef idx="minor">
+            <a:schemeClr val="tx1"/>
+          </a:fontRef>
+        </p:style>
+      </p:cxnSp>
+      <p:cxnSp>
+        <p:nvCxnSpPr>
+          <p:cNvPr id="36" name="Straight Connector 35">
+            <a:extLst>
+              <a:ext uri="{FF2B5EF4-FFF2-40B4-BE49-F238E27FC236}">
+                <a16:creationId xmlns:a16="http://schemas.microsoft.com/office/drawing/2014/main" id="{1C6081C7-1E64-4128-8757-5DF37A5F3738}"/>
+              </a:ext>
+            </a:extLst>
+          </p:cNvPr>
+          <p:cNvCxnSpPr>
+            <a:cxnSpLocks/>
+          </p:cNvCxnSpPr>
+          <p:nvPr/>
+        </p:nvCxnSpPr>
+        <p:spPr>
+          <a:xfrm flipH="1" flipV="1">
+            <a:off x="9818688" y="4648200"/>
+            <a:ext cx="146051" cy="177802"/>
           </a:xfrm>
           <a:prstGeom prst="line">
             <a:avLst/>

</xml_diff>